<commit_message>
add uriImage for user profil
</commit_message>
<xml_diff>
--- a/modèleDeDonnéeAvecAttribut.pptx
+++ b/modèleDeDonnéeAvecAttribut.pptx
@@ -261,7 +261,7 @@
           <a:p>
             <a:fld id="{A9BBF9DA-6C62-4544-9DE7-8603C0B882EE}" type="datetimeFigureOut">
               <a:rPr lang="fr-FR" smtClean="0"/>
-              <a:t>13/01/2022</a:t>
+              <a:t>25/02/2022</a:t>
             </a:fld>
             <a:endParaRPr lang="fr-FR"/>
           </a:p>
@@ -461,7 +461,7 @@
           <a:p>
             <a:fld id="{A9BBF9DA-6C62-4544-9DE7-8603C0B882EE}" type="datetimeFigureOut">
               <a:rPr lang="fr-FR" smtClean="0"/>
-              <a:t>13/01/2022</a:t>
+              <a:t>25/02/2022</a:t>
             </a:fld>
             <a:endParaRPr lang="fr-FR"/>
           </a:p>
@@ -671,7 +671,7 @@
           <a:p>
             <a:fld id="{A9BBF9DA-6C62-4544-9DE7-8603C0B882EE}" type="datetimeFigureOut">
               <a:rPr lang="fr-FR" smtClean="0"/>
-              <a:t>13/01/2022</a:t>
+              <a:t>25/02/2022</a:t>
             </a:fld>
             <a:endParaRPr lang="fr-FR"/>
           </a:p>
@@ -871,7 +871,7 @@
           <a:p>
             <a:fld id="{A9BBF9DA-6C62-4544-9DE7-8603C0B882EE}" type="datetimeFigureOut">
               <a:rPr lang="fr-FR" smtClean="0"/>
-              <a:t>13/01/2022</a:t>
+              <a:t>25/02/2022</a:t>
             </a:fld>
             <a:endParaRPr lang="fr-FR"/>
           </a:p>
@@ -1147,7 +1147,7 @@
           <a:p>
             <a:fld id="{A9BBF9DA-6C62-4544-9DE7-8603C0B882EE}" type="datetimeFigureOut">
               <a:rPr lang="fr-FR" smtClean="0"/>
-              <a:t>13/01/2022</a:t>
+              <a:t>25/02/2022</a:t>
             </a:fld>
             <a:endParaRPr lang="fr-FR"/>
           </a:p>
@@ -1415,7 +1415,7 @@
           <a:p>
             <a:fld id="{A9BBF9DA-6C62-4544-9DE7-8603C0B882EE}" type="datetimeFigureOut">
               <a:rPr lang="fr-FR" smtClean="0"/>
-              <a:t>13/01/2022</a:t>
+              <a:t>25/02/2022</a:t>
             </a:fld>
             <a:endParaRPr lang="fr-FR"/>
           </a:p>
@@ -1830,7 +1830,7 @@
           <a:p>
             <a:fld id="{A9BBF9DA-6C62-4544-9DE7-8603C0B882EE}" type="datetimeFigureOut">
               <a:rPr lang="fr-FR" smtClean="0"/>
-              <a:t>13/01/2022</a:t>
+              <a:t>25/02/2022</a:t>
             </a:fld>
             <a:endParaRPr lang="fr-FR"/>
           </a:p>
@@ -1972,7 +1972,7 @@
           <a:p>
             <a:fld id="{A9BBF9DA-6C62-4544-9DE7-8603C0B882EE}" type="datetimeFigureOut">
               <a:rPr lang="fr-FR" smtClean="0"/>
-              <a:t>13/01/2022</a:t>
+              <a:t>25/02/2022</a:t>
             </a:fld>
             <a:endParaRPr lang="fr-FR"/>
           </a:p>
@@ -2085,7 +2085,7 @@
           <a:p>
             <a:fld id="{A9BBF9DA-6C62-4544-9DE7-8603C0B882EE}" type="datetimeFigureOut">
               <a:rPr lang="fr-FR" smtClean="0"/>
-              <a:t>13/01/2022</a:t>
+              <a:t>25/02/2022</a:t>
             </a:fld>
             <a:endParaRPr lang="fr-FR"/>
           </a:p>
@@ -2398,7 +2398,7 @@
           <a:p>
             <a:fld id="{A9BBF9DA-6C62-4544-9DE7-8603C0B882EE}" type="datetimeFigureOut">
               <a:rPr lang="fr-FR" smtClean="0"/>
-              <a:t>13/01/2022</a:t>
+              <a:t>25/02/2022</a:t>
             </a:fld>
             <a:endParaRPr lang="fr-FR"/>
           </a:p>
@@ -2687,7 +2687,7 @@
           <a:p>
             <a:fld id="{A9BBF9DA-6C62-4544-9DE7-8603C0B882EE}" type="datetimeFigureOut">
               <a:rPr lang="fr-FR" smtClean="0"/>
-              <a:t>13/01/2022</a:t>
+              <a:t>25/02/2022</a:t>
             </a:fld>
             <a:endParaRPr lang="fr-FR"/>
           </a:p>
@@ -2930,7 +2930,7 @@
           <a:p>
             <a:fld id="{A9BBF9DA-6C62-4544-9DE7-8603C0B882EE}" type="datetimeFigureOut">
               <a:rPr lang="fr-FR" smtClean="0"/>
-              <a:t>13/01/2022</a:t>
+              <a:t>25/02/2022</a:t>
             </a:fld>
             <a:endParaRPr lang="fr-FR"/>
           </a:p>
@@ -3622,7 +3622,7 @@
         <p:spPr>
           <a:xfrm>
             <a:off x="2250414" y="2872970"/>
-            <a:ext cx="2181981" cy="2815393"/>
+            <a:ext cx="2181981" cy="2971958"/>
           </a:xfrm>
           <a:prstGeom prst="rect">
             <a:avLst/>
@@ -3671,7 +3671,7 @@
         <p:spPr>
           <a:xfrm>
             <a:off x="2250414" y="3119712"/>
-            <a:ext cx="2181981" cy="2568647"/>
+            <a:ext cx="2181981" cy="2725222"/>
           </a:xfrm>
           <a:prstGeom prst="roundRect">
             <a:avLst/>
@@ -3717,7 +3717,7 @@
         <p:spPr>
           <a:xfrm>
             <a:off x="2410071" y="3226151"/>
-            <a:ext cx="1852990" cy="2462213"/>
+            <a:ext cx="1852990" cy="2631490"/>
           </a:xfrm>
           <a:prstGeom prst="rect">
             <a:avLst/>
@@ -3888,6 +3888,17 @@
             </a:r>
             <a:endParaRPr lang="fr-FR" sz="1100" dirty="0"/>
           </a:p>
+          <a:p>
+            <a:pPr marL="285750" indent="-285750">
+              <a:buFontTx/>
+              <a:buChar char="-"/>
+            </a:pPr>
+            <a:r>
+              <a:rPr lang="fr-FR" sz="1100" dirty="0" err="1"/>
+              <a:t>createdBy</a:t>
+            </a:r>
+            <a:endParaRPr lang="fr-FR" sz="1100" dirty="0"/>
+          </a:p>
         </p:txBody>
       </p:sp>
       <p:sp>
@@ -3941,7 +3952,7 @@
         <p:spPr>
           <a:xfrm>
             <a:off x="7838417" y="1395338"/>
-            <a:ext cx="2181981" cy="1283825"/>
+            <a:ext cx="2181981" cy="1386195"/>
           </a:xfrm>
           <a:prstGeom prst="rect">
             <a:avLst/>
@@ -3990,7 +4001,7 @@
         <p:spPr>
           <a:xfrm>
             <a:off x="7838417" y="1740450"/>
-            <a:ext cx="2181981" cy="938719"/>
+            <a:ext cx="2181981" cy="1048335"/>
           </a:xfrm>
           <a:prstGeom prst="roundRect">
             <a:avLst/>
@@ -4036,7 +4047,7 @@
         <p:spPr>
           <a:xfrm>
             <a:off x="7945775" y="1747892"/>
-            <a:ext cx="1852990" cy="1107996"/>
+            <a:ext cx="1852990" cy="1277273"/>
           </a:xfrm>
           <a:prstGeom prst="rect">
             <a:avLst/>
@@ -4102,6 +4113,17 @@
             <a:r>
               <a:rPr lang="fr-FR" sz="1100" dirty="0" err="1"/>
               <a:t>seedingDate</a:t>
+            </a:r>
+            <a:endParaRPr lang="fr-FR" sz="1100" dirty="0"/>
+          </a:p>
+          <a:p>
+            <a:pPr marL="285750" indent="-285750">
+              <a:buFontTx/>
+              <a:buChar char="-"/>
+            </a:pPr>
+            <a:r>
+              <a:rPr lang="fr-FR" sz="1100" dirty="0" err="1"/>
+              <a:t>createdBy</a:t>
             </a:r>
             <a:endParaRPr lang="fr-FR" sz="1100" dirty="0"/>
           </a:p>
@@ -4260,7 +4282,7 @@
         <p:spPr>
           <a:xfrm>
             <a:off x="7998074" y="3458564"/>
-            <a:ext cx="1852990" cy="2123658"/>
+            <a:ext cx="1852990" cy="1954381"/>
           </a:xfrm>
           <a:prstGeom prst="rect">
             <a:avLst/>
@@ -4387,18 +4409,7 @@
             </a:pPr>
             <a:r>
               <a:rPr lang="fr-FR" sz="1100" dirty="0" err="1"/>
-              <a:t>reference</a:t>
-            </a:r>
-            <a:endParaRPr lang="fr-FR" sz="1100" dirty="0"/>
-          </a:p>
-          <a:p>
-            <a:pPr marL="285750" indent="-285750">
-              <a:buFontTx/>
-              <a:buChar char="-"/>
-            </a:pPr>
-            <a:r>
-              <a:rPr lang="fr-FR" sz="1100" dirty="0" err="1"/>
-              <a:t>wavelength</a:t>
+              <a:t>createdBy</a:t>
             </a:r>
             <a:endParaRPr lang="fr-FR" sz="1100" dirty="0"/>
           </a:p>
@@ -4658,7 +4669,7 @@
         <p:spPr>
           <a:xfrm>
             <a:off x="3529584" y="2161842"/>
-            <a:ext cx="4416191" cy="140048"/>
+            <a:ext cx="4416191" cy="224687"/>
           </a:xfrm>
           <a:prstGeom prst="line">
             <a:avLst/>
@@ -5254,6 +5265,194 @@
           <a:xfrm flipV="1">
             <a:off x="5241110" y="4509067"/>
             <a:ext cx="9676" cy="1022037"/>
+          </a:xfrm>
+          <a:prstGeom prst="line">
+            <a:avLst/>
+          </a:prstGeom>
+        </p:spPr>
+        <p:style>
+          <a:lnRef idx="1">
+            <a:schemeClr val="dk1"/>
+          </a:lnRef>
+          <a:fillRef idx="0">
+            <a:schemeClr val="dk1"/>
+          </a:fillRef>
+          <a:effectRef idx="0">
+            <a:schemeClr val="dk1"/>
+          </a:effectRef>
+          <a:fontRef idx="minor">
+            <a:schemeClr val="tx1"/>
+          </a:fontRef>
+        </p:style>
+      </p:cxnSp>
+      <p:cxnSp>
+        <p:nvCxnSpPr>
+          <p:cNvPr id="38" name="Straight Connector 37">
+            <a:extLst>
+              <a:ext uri="{FF2B5EF4-FFF2-40B4-BE49-F238E27FC236}">
+                <a16:creationId xmlns:a16="http://schemas.microsoft.com/office/drawing/2014/main" id="{06CE6E2E-3856-4FB2-97F5-EDA8A853618F}"/>
+              </a:ext>
+            </a:extLst>
+          </p:cNvPr>
+          <p:cNvCxnSpPr/>
+          <p:nvPr/>
+        </p:nvCxnSpPr>
+        <p:spPr>
+          <a:xfrm flipH="1">
+            <a:off x="6451697" y="5273427"/>
+            <a:ext cx="1582057" cy="0"/>
+          </a:xfrm>
+          <a:prstGeom prst="line">
+            <a:avLst/>
+          </a:prstGeom>
+        </p:spPr>
+        <p:style>
+          <a:lnRef idx="1">
+            <a:schemeClr val="dk1"/>
+          </a:lnRef>
+          <a:fillRef idx="0">
+            <a:schemeClr val="dk1"/>
+          </a:fillRef>
+          <a:effectRef idx="0">
+            <a:schemeClr val="dk1"/>
+          </a:effectRef>
+          <a:fontRef idx="minor">
+            <a:schemeClr val="tx1"/>
+          </a:fontRef>
+        </p:style>
+      </p:cxnSp>
+      <p:cxnSp>
+        <p:nvCxnSpPr>
+          <p:cNvPr id="39" name="Straight Connector 38">
+            <a:extLst>
+              <a:ext uri="{FF2B5EF4-FFF2-40B4-BE49-F238E27FC236}">
+                <a16:creationId xmlns:a16="http://schemas.microsoft.com/office/drawing/2014/main" id="{5E0B26B7-7AC3-4625-8C05-73F1D81C12AF}"/>
+              </a:ext>
+            </a:extLst>
+          </p:cNvPr>
+          <p:cNvCxnSpPr>
+            <a:cxnSpLocks/>
+          </p:cNvCxnSpPr>
+          <p:nvPr/>
+        </p:nvCxnSpPr>
+        <p:spPr>
+          <a:xfrm flipV="1">
+            <a:off x="6451697" y="4821220"/>
+            <a:ext cx="0" cy="452207"/>
+          </a:xfrm>
+          <a:prstGeom prst="line">
+            <a:avLst/>
+          </a:prstGeom>
+        </p:spPr>
+        <p:style>
+          <a:lnRef idx="1">
+            <a:schemeClr val="dk1"/>
+          </a:lnRef>
+          <a:fillRef idx="0">
+            <a:schemeClr val="dk1"/>
+          </a:fillRef>
+          <a:effectRef idx="0">
+            <a:schemeClr val="dk1"/>
+          </a:effectRef>
+          <a:fontRef idx="minor">
+            <a:schemeClr val="tx1"/>
+          </a:fontRef>
+        </p:style>
+      </p:cxnSp>
+      <p:cxnSp>
+        <p:nvCxnSpPr>
+          <p:cNvPr id="40" name="Straight Connector 39">
+            <a:extLst>
+              <a:ext uri="{FF2B5EF4-FFF2-40B4-BE49-F238E27FC236}">
+                <a16:creationId xmlns:a16="http://schemas.microsoft.com/office/drawing/2014/main" id="{38BC8DD1-16DD-4277-BBA6-EA0A1066178A}"/>
+              </a:ext>
+            </a:extLst>
+          </p:cNvPr>
+          <p:cNvCxnSpPr>
+            <a:cxnSpLocks/>
+          </p:cNvCxnSpPr>
+          <p:nvPr/>
+        </p:nvCxnSpPr>
+        <p:spPr>
+          <a:xfrm flipV="1">
+            <a:off x="5246820" y="5273427"/>
+            <a:ext cx="0" cy="452207"/>
+          </a:xfrm>
+          <a:prstGeom prst="line">
+            <a:avLst/>
+          </a:prstGeom>
+        </p:spPr>
+        <p:style>
+          <a:lnRef idx="1">
+            <a:schemeClr val="dk1"/>
+          </a:lnRef>
+          <a:fillRef idx="0">
+            <a:schemeClr val="dk1"/>
+          </a:fillRef>
+          <a:effectRef idx="0">
+            <a:schemeClr val="dk1"/>
+          </a:effectRef>
+          <a:fontRef idx="minor">
+            <a:schemeClr val="tx1"/>
+          </a:fontRef>
+        </p:style>
+      </p:cxnSp>
+      <p:cxnSp>
+        <p:nvCxnSpPr>
+          <p:cNvPr id="41" name="Straight Connector 40">
+            <a:extLst>
+              <a:ext uri="{FF2B5EF4-FFF2-40B4-BE49-F238E27FC236}">
+                <a16:creationId xmlns:a16="http://schemas.microsoft.com/office/drawing/2014/main" id="{C3770652-A48D-4F1F-9CC1-0D32696336AC}"/>
+              </a:ext>
+            </a:extLst>
+          </p:cNvPr>
+          <p:cNvCxnSpPr>
+            <a:cxnSpLocks/>
+          </p:cNvCxnSpPr>
+          <p:nvPr/>
+        </p:nvCxnSpPr>
+        <p:spPr>
+          <a:xfrm flipH="1">
+            <a:off x="3580871" y="5725634"/>
+            <a:ext cx="1665949" cy="0"/>
+          </a:xfrm>
+          <a:prstGeom prst="line">
+            <a:avLst/>
+          </a:prstGeom>
+        </p:spPr>
+        <p:style>
+          <a:lnRef idx="1">
+            <a:schemeClr val="dk1"/>
+          </a:lnRef>
+          <a:fillRef idx="0">
+            <a:schemeClr val="dk1"/>
+          </a:fillRef>
+          <a:effectRef idx="0">
+            <a:schemeClr val="dk1"/>
+          </a:effectRef>
+          <a:fontRef idx="minor">
+            <a:schemeClr val="tx1"/>
+          </a:fontRef>
+        </p:style>
+      </p:cxnSp>
+      <p:cxnSp>
+        <p:nvCxnSpPr>
+          <p:cNvPr id="42" name="Straight Connector 41">
+            <a:extLst>
+              <a:ext uri="{FF2B5EF4-FFF2-40B4-BE49-F238E27FC236}">
+                <a16:creationId xmlns:a16="http://schemas.microsoft.com/office/drawing/2014/main" id="{E7C902DD-B2CE-458F-8BAB-DF25A7A10B77}"/>
+              </a:ext>
+            </a:extLst>
+          </p:cNvPr>
+          <p:cNvCxnSpPr>
+            <a:cxnSpLocks/>
+          </p:cNvCxnSpPr>
+          <p:nvPr/>
+        </p:nvCxnSpPr>
+        <p:spPr>
+          <a:xfrm flipH="1">
+            <a:off x="7087906" y="2716396"/>
+            <a:ext cx="910169" cy="0"/>
           </a:xfrm>
           <a:prstGeom prst="line">
             <a:avLst/>

</xml_diff>